<commit_message>
Added Hidden to Outgoing & Incoming
</commit_message>
<xml_diff>
--- a/Just One More Program Prez2.pptx
+++ b/Just One More Program Prez2.pptx
@@ -220,7 +220,7 @@
           <a:p>
             <a:fld id="{17DA0944-9B2D-6A4B-AD9B-2B69668DD4F9}" type="datetimeFigureOut">
               <a:rPr lang="en-US" smtClean="0"/>
-              <a:t>10/27/17</a:t>
+              <a:t>11/2/17</a:t>
             </a:fld>
             <a:endParaRPr lang="en-US"/>
           </a:p>
@@ -385,7 +385,7 @@
           <a:p>
             <a:fld id="{E798DE45-1E76-E243-BB1D-2A263560F466}" type="datetimeFigureOut">
               <a:rPr lang="en-US" smtClean="0"/>
-              <a:t>10/27/17</a:t>
+              <a:t>11/2/17</a:t>
             </a:fld>
             <a:endParaRPr lang="en-US"/>
           </a:p>
@@ -712,11 +712,7 @@
           <a:p>
             <a:r>
               <a:rPr lang="en-US" baseline="0" dirty="0" smtClean="0"/>
-              <a:t>The Only food Categories are Bakery, Deli, Dairy, Meat, Produce, &amp; </a:t>
-            </a:r>
-            <a:r>
-              <a:rPr lang="en-US" baseline="0" dirty="0" smtClean="0"/>
-              <a:t>Pantry</a:t>
+              <a:t>The Only food Categories are Bakery, Deli, Dairy, Meat, Produce, &amp; Pantry</a:t>
             </a:r>
           </a:p>
         </p:txBody>
@@ -908,11 +904,7 @@
             </a:r>
             <a:r>
               <a:rPr lang="en-US" baseline="0" dirty="0" smtClean="0"/>
-              <a:t> in </a:t>
-            </a:r>
-            <a:r>
-              <a:rPr lang="en-US" baseline="0" dirty="0" smtClean="0"/>
-              <a:t>page</a:t>
+              <a:t> in page</a:t>
             </a:r>
           </a:p>
           <a:p>
@@ -1113,11 +1105,7 @@
             </a:r>
             <a:r>
               <a:rPr lang="en-US" baseline="0" dirty="0" smtClean="0"/>
-              <a:t> </a:t>
-            </a:r>
-            <a:r>
-              <a:rPr lang="en-US" baseline="0" dirty="0" smtClean="0"/>
-              <a:t>Screen. The dropdown search bar need to search both incoming and outgoing tables if the layout of the page is kept like this. I don’t know how difficult will be, so if it becomes to difficult we can create separate search pages for incoming and outgoing partners. </a:t>
+              <a:t> Screen. The dropdown search bar need to search both incoming and outgoing tables if the layout of the page is kept like this. I don’t know how difficult will be, so if it becomes to difficult we can create separate search pages for incoming and outgoing partners. </a:t>
             </a:r>
             <a:endParaRPr lang="en-US" dirty="0"/>
           </a:p>
@@ -1209,11 +1197,7 @@
             </a:r>
             <a:r>
               <a:rPr lang="en-US" baseline="0" dirty="0" smtClean="0"/>
-              <a:t>s is the page for looking at a partners </a:t>
-            </a:r>
-            <a:r>
-              <a:rPr lang="en-US" baseline="0" dirty="0" smtClean="0"/>
-              <a:t>information</a:t>
+              <a:t>s is the page for looking at a partners information</a:t>
             </a:r>
           </a:p>
           <a:p>
@@ -2159,7 +2143,7 @@
           <a:p>
             <a:fld id="{82E4D609-7294-A845-AA45-B5A07A659EF5}" type="datetimeFigureOut">
               <a:rPr lang="en-US" smtClean="0"/>
-              <a:t>10/27/17</a:t>
+              <a:t>11/2/17</a:t>
             </a:fld>
             <a:endParaRPr lang="en-US"/>
           </a:p>
@@ -3242,7 +3226,7 @@
           <a:p>
             <a:fld id="{82E4D609-7294-A845-AA45-B5A07A659EF5}" type="datetimeFigureOut">
               <a:rPr lang="en-US" smtClean="0"/>
-              <a:t>10/27/17</a:t>
+              <a:t>11/2/17</a:t>
             </a:fld>
             <a:endParaRPr lang="en-US"/>
           </a:p>
@@ -4217,7 +4201,7 @@
           <a:p>
             <a:fld id="{82E4D609-7294-A845-AA45-B5A07A659EF5}" type="datetimeFigureOut">
               <a:rPr lang="en-US" smtClean="0"/>
-              <a:t>10/27/17</a:t>
+              <a:t>11/2/17</a:t>
             </a:fld>
             <a:endParaRPr lang="en-US"/>
           </a:p>
@@ -5346,7 +5330,7 @@
           <a:p>
             <a:fld id="{82E4D609-7294-A845-AA45-B5A07A659EF5}" type="datetimeFigureOut">
               <a:rPr lang="en-US" smtClean="0"/>
-              <a:t>10/27/17</a:t>
+              <a:t>11/2/17</a:t>
             </a:fld>
             <a:endParaRPr lang="en-US"/>
           </a:p>
@@ -6374,7 +6358,7 @@
           <a:p>
             <a:fld id="{82E4D609-7294-A845-AA45-B5A07A659EF5}" type="datetimeFigureOut">
               <a:rPr lang="en-US" smtClean="0"/>
-              <a:t>10/27/17</a:t>
+              <a:t>11/2/17</a:t>
             </a:fld>
             <a:endParaRPr lang="en-US"/>
           </a:p>
@@ -7029,7 +7013,7 @@
           <a:p>
             <a:fld id="{82E4D609-7294-A845-AA45-B5A07A659EF5}" type="datetimeFigureOut">
               <a:rPr lang="en-US" smtClean="0"/>
-              <a:t>10/27/17</a:t>
+              <a:t>11/2/17</a:t>
             </a:fld>
             <a:endParaRPr lang="en-US"/>
           </a:p>
@@ -7885,7 +7869,7 @@
           <a:p>
             <a:fld id="{82E4D609-7294-A845-AA45-B5A07A659EF5}" type="datetimeFigureOut">
               <a:rPr lang="en-US" smtClean="0"/>
-              <a:t>10/27/17</a:t>
+              <a:t>11/2/17</a:t>
             </a:fld>
             <a:endParaRPr lang="en-US"/>
           </a:p>
@@ -8070,7 +8054,7 @@
           <a:p>
             <a:fld id="{82E4D609-7294-A845-AA45-B5A07A659EF5}" type="datetimeFigureOut">
               <a:rPr lang="en-US" smtClean="0"/>
-              <a:t>10/27/17</a:t>
+              <a:t>11/2/17</a:t>
             </a:fld>
             <a:endParaRPr lang="en-US"/>
           </a:p>
@@ -9037,7 +9021,7 @@
           <a:p>
             <a:fld id="{82E4D609-7294-A845-AA45-B5A07A659EF5}" type="datetimeFigureOut">
               <a:rPr lang="en-US" smtClean="0"/>
-              <a:t>10/27/17</a:t>
+              <a:t>11/2/17</a:t>
             </a:fld>
             <a:endParaRPr lang="en-US"/>
           </a:p>
@@ -9464,7 +9448,7 @@
           <a:p>
             <a:fld id="{82E4D609-7294-A845-AA45-B5A07A659EF5}" type="datetimeFigureOut">
               <a:rPr lang="en-US" smtClean="0"/>
-              <a:t>10/27/17</a:t>
+              <a:t>11/2/17</a:t>
             </a:fld>
             <a:endParaRPr lang="en-US"/>
           </a:p>
@@ -9690,7 +9674,7 @@
           <a:p>
             <a:fld id="{82E4D609-7294-A845-AA45-B5A07A659EF5}" type="datetimeFigureOut">
               <a:rPr lang="en-US" smtClean="0"/>
-              <a:t>10/27/17</a:t>
+              <a:t>11/2/17</a:t>
             </a:fld>
             <a:endParaRPr lang="en-US"/>
           </a:p>
@@ -9860,7 +9844,7 @@
           <a:p>
             <a:fld id="{82E4D609-7294-A845-AA45-B5A07A659EF5}" type="datetimeFigureOut">
               <a:rPr lang="en-US" smtClean="0"/>
-              <a:t>10/27/17</a:t>
+              <a:t>11/2/17</a:t>
             </a:fld>
             <a:endParaRPr lang="en-US"/>
           </a:p>
@@ -10889,7 +10873,7 @@
           <a:p>
             <a:fld id="{82E4D609-7294-A845-AA45-B5A07A659EF5}" type="datetimeFigureOut">
               <a:rPr lang="en-US" smtClean="0"/>
-              <a:t>10/27/17</a:t>
+              <a:t>11/2/17</a:t>
             </a:fld>
             <a:endParaRPr lang="en-US"/>
           </a:p>
@@ -11156,7 +11140,7 @@
           <a:p>
             <a:fld id="{82E4D609-7294-A845-AA45-B5A07A659EF5}" type="datetimeFigureOut">
               <a:rPr lang="en-US" smtClean="0"/>
-              <a:t>10/27/17</a:t>
+              <a:t>11/2/17</a:t>
             </a:fld>
             <a:endParaRPr lang="en-US"/>
           </a:p>
@@ -11561,7 +11545,7 @@
           <a:p>
             <a:fld id="{82E4D609-7294-A845-AA45-B5A07A659EF5}" type="datetimeFigureOut">
               <a:rPr lang="en-US" smtClean="0"/>
-              <a:t>10/27/17</a:t>
+              <a:t>11/2/17</a:t>
             </a:fld>
             <a:endParaRPr lang="en-US"/>
           </a:p>
@@ -11683,7 +11667,7 @@
           <a:p>
             <a:fld id="{82E4D609-7294-A845-AA45-B5A07A659EF5}" type="datetimeFigureOut">
               <a:rPr lang="en-US" smtClean="0"/>
-              <a:t>10/27/17</a:t>
+              <a:t>11/2/17</a:t>
             </a:fld>
             <a:endParaRPr lang="en-US"/>
           </a:p>
@@ -11773,7 +11757,7 @@
           <a:p>
             <a:fld id="{82E4D609-7294-A845-AA45-B5A07A659EF5}" type="datetimeFigureOut">
               <a:rPr lang="en-US" smtClean="0"/>
-              <a:t>10/27/17</a:t>
+              <a:t>11/2/17</a:t>
             </a:fld>
             <a:endParaRPr lang="en-US"/>
           </a:p>
@@ -12849,7 +12833,7 @@
           <a:p>
             <a:fld id="{82E4D609-7294-A845-AA45-B5A07A659EF5}" type="datetimeFigureOut">
               <a:rPr lang="en-US" smtClean="0"/>
-              <a:t>10/27/17</a:t>
+              <a:t>11/2/17</a:t>
             </a:fld>
             <a:endParaRPr lang="en-US"/>
           </a:p>
@@ -13952,7 +13936,7 @@
           <a:p>
             <a:fld id="{82E4D609-7294-A845-AA45-B5A07A659EF5}" type="datetimeFigureOut">
               <a:rPr lang="en-US" smtClean="0"/>
-              <a:t>10/27/17</a:t>
+              <a:t>11/2/17</a:t>
             </a:fld>
             <a:endParaRPr lang="en-US"/>
           </a:p>
@@ -15015,7 +14999,7 @@
           <a:p>
             <a:fld id="{82E4D609-7294-A845-AA45-B5A07A659EF5}" type="datetimeFigureOut">
               <a:rPr lang="en-US" smtClean="0"/>
-              <a:t>10/27/17</a:t>
+              <a:t>11/2/17</a:t>
             </a:fld>
             <a:endParaRPr lang="en-US"/>
           </a:p>
@@ -15990,7 +15974,7 @@
           <a:p>
             <a:fld id="{82E4D609-7294-A845-AA45-B5A07A659EF5}" type="datetimeFigureOut">
               <a:rPr lang="en-US" smtClean="0"/>
-              <a:t>10/27/17</a:t>
+              <a:t>11/2/17</a:t>
             </a:fld>
             <a:endParaRPr lang="en-US"/>
           </a:p>
@@ -17119,7 +17103,7 @@
           <a:p>
             <a:fld id="{82E4D609-7294-A845-AA45-B5A07A659EF5}" type="datetimeFigureOut">
               <a:rPr lang="en-US" smtClean="0"/>
-              <a:t>10/27/17</a:t>
+              <a:t>11/2/17</a:t>
             </a:fld>
             <a:endParaRPr lang="en-US"/>
           </a:p>
@@ -18184,7 +18168,7 @@
           <a:p>
             <a:fld id="{82E4D609-7294-A845-AA45-B5A07A659EF5}" type="datetimeFigureOut">
               <a:rPr lang="en-US" smtClean="0"/>
-              <a:t>10/27/17</a:t>
+              <a:t>11/2/17</a:t>
             </a:fld>
             <a:endParaRPr lang="en-US"/>
           </a:p>
@@ -19212,7 +19196,7 @@
           <a:p>
             <a:fld id="{82E4D609-7294-A845-AA45-B5A07A659EF5}" type="datetimeFigureOut">
               <a:rPr lang="en-US" smtClean="0"/>
-              <a:t>10/27/17</a:t>
+              <a:t>11/2/17</a:t>
             </a:fld>
             <a:endParaRPr lang="en-US"/>
           </a:p>
@@ -19867,7 +19851,7 @@
           <a:p>
             <a:fld id="{82E4D609-7294-A845-AA45-B5A07A659EF5}" type="datetimeFigureOut">
               <a:rPr lang="en-US" smtClean="0"/>
-              <a:t>10/27/17</a:t>
+              <a:t>11/2/17</a:t>
             </a:fld>
             <a:endParaRPr lang="en-US"/>
           </a:p>
@@ -20723,7 +20707,7 @@
           <a:p>
             <a:fld id="{82E4D609-7294-A845-AA45-B5A07A659EF5}" type="datetimeFigureOut">
               <a:rPr lang="en-US" smtClean="0"/>
-              <a:t>10/27/17</a:t>
+              <a:t>11/2/17</a:t>
             </a:fld>
             <a:endParaRPr lang="en-US"/>
           </a:p>
@@ -20908,7 +20892,7 @@
           <a:p>
             <a:fld id="{82E4D609-7294-A845-AA45-B5A07A659EF5}" type="datetimeFigureOut">
               <a:rPr lang="en-US" smtClean="0"/>
-              <a:t>10/27/17</a:t>
+              <a:t>11/2/17</a:t>
             </a:fld>
             <a:endParaRPr lang="en-US"/>
           </a:p>
@@ -21875,7 +21859,7 @@
           <a:p>
             <a:fld id="{82E4D609-7294-A845-AA45-B5A07A659EF5}" type="datetimeFigureOut">
               <a:rPr lang="en-US" smtClean="0"/>
-              <a:t>10/27/17</a:t>
+              <a:t>11/2/17</a:t>
             </a:fld>
             <a:endParaRPr lang="en-US"/>
           </a:p>
@@ -22098,7 +22082,7 @@
           <a:p>
             <a:fld id="{82E4D609-7294-A845-AA45-B5A07A659EF5}" type="datetimeFigureOut">
               <a:rPr lang="en-US" smtClean="0"/>
-              <a:t>10/27/17</a:t>
+              <a:t>11/2/17</a:t>
             </a:fld>
             <a:endParaRPr lang="en-US"/>
           </a:p>
@@ -22263,7 +22247,7 @@
           <a:p>
             <a:fld id="{82E4D609-7294-A845-AA45-B5A07A659EF5}" type="datetimeFigureOut">
               <a:rPr lang="en-US" smtClean="0"/>
-              <a:t>10/27/17</a:t>
+              <a:t>11/2/17</a:t>
             </a:fld>
             <a:endParaRPr lang="en-US"/>
           </a:p>
@@ -22504,7 +22488,7 @@
           <a:p>
             <a:fld id="{82E4D609-7294-A845-AA45-B5A07A659EF5}" type="datetimeFigureOut">
               <a:rPr lang="en-US" smtClean="0"/>
-              <a:t>10/27/17</a:t>
+              <a:t>11/2/17</a:t>
             </a:fld>
             <a:endParaRPr lang="en-US"/>
           </a:p>
@@ -22731,7 +22715,7 @@
           <a:p>
             <a:fld id="{82E4D609-7294-A845-AA45-B5A07A659EF5}" type="datetimeFigureOut">
               <a:rPr lang="en-US" smtClean="0"/>
-              <a:t>10/27/17</a:t>
+              <a:t>11/2/17</a:t>
             </a:fld>
             <a:endParaRPr lang="en-US"/>
           </a:p>
@@ -23093,7 +23077,7 @@
           <a:p>
             <a:fld id="{82E4D609-7294-A845-AA45-B5A07A659EF5}" type="datetimeFigureOut">
               <a:rPr lang="en-US" smtClean="0"/>
-              <a:t>10/27/17</a:t>
+              <a:t>11/2/17</a:t>
             </a:fld>
             <a:endParaRPr lang="en-US"/>
           </a:p>
@@ -23324,7 +23308,7 @@
           <a:p>
             <a:fld id="{82E4D609-7294-A845-AA45-B5A07A659EF5}" type="datetimeFigureOut">
               <a:rPr lang="en-US" smtClean="0"/>
-              <a:t>10/27/17</a:t>
+              <a:t>11/2/17</a:t>
             </a:fld>
             <a:endParaRPr lang="en-US"/>
           </a:p>
@@ -23437,7 +23421,7 @@
           <a:p>
             <a:fld id="{82E4D609-7294-A845-AA45-B5A07A659EF5}" type="datetimeFigureOut">
               <a:rPr lang="en-US" smtClean="0"/>
-              <a:t>10/27/17</a:t>
+              <a:t>11/2/17</a:t>
             </a:fld>
             <a:endParaRPr lang="en-US"/>
           </a:p>
@@ -23527,7 +23511,7 @@
           <a:p>
             <a:fld id="{82E4D609-7294-A845-AA45-B5A07A659EF5}" type="datetimeFigureOut">
               <a:rPr lang="en-US" smtClean="0"/>
-              <a:t>10/27/17</a:t>
+              <a:t>11/2/17</a:t>
             </a:fld>
             <a:endParaRPr lang="en-US"/>
           </a:p>
@@ -23799,7 +23783,7 @@
           <a:p>
             <a:fld id="{82E4D609-7294-A845-AA45-B5A07A659EF5}" type="datetimeFigureOut">
               <a:rPr lang="en-US" smtClean="0"/>
-              <a:t>10/27/17</a:t>
+              <a:t>11/2/17</a:t>
             </a:fld>
             <a:endParaRPr lang="en-US"/>
           </a:p>
@@ -24047,7 +24031,7 @@
           <a:p>
             <a:fld id="{82E4D609-7294-A845-AA45-B5A07A659EF5}" type="datetimeFigureOut">
               <a:rPr lang="en-US" smtClean="0"/>
-              <a:t>10/27/17</a:t>
+              <a:t>11/2/17</a:t>
             </a:fld>
             <a:endParaRPr lang="en-US"/>
           </a:p>
@@ -24212,7 +24196,7 @@
           <a:p>
             <a:fld id="{82E4D609-7294-A845-AA45-B5A07A659EF5}" type="datetimeFigureOut">
               <a:rPr lang="en-US" smtClean="0"/>
-              <a:t>10/27/17</a:t>
+              <a:t>11/2/17</a:t>
             </a:fld>
             <a:endParaRPr lang="en-US"/>
           </a:p>
@@ -24387,7 +24371,7 @@
           <a:p>
             <a:fld id="{82E4D609-7294-A845-AA45-B5A07A659EF5}" type="datetimeFigureOut">
               <a:rPr lang="en-US" smtClean="0"/>
-              <a:t>10/27/17</a:t>
+              <a:t>11/2/17</a:t>
             </a:fld>
             <a:endParaRPr lang="en-US"/>
           </a:p>
@@ -24792,7 +24776,7 @@
           <a:p>
             <a:fld id="{82E4D609-7294-A845-AA45-B5A07A659EF5}" type="datetimeFigureOut">
               <a:rPr lang="en-US" smtClean="0"/>
-              <a:t>10/27/17</a:t>
+              <a:t>11/2/17</a:t>
             </a:fld>
             <a:endParaRPr lang="en-US"/>
           </a:p>
@@ -24914,7 +24898,7 @@
           <a:p>
             <a:fld id="{82E4D609-7294-A845-AA45-B5A07A659EF5}" type="datetimeFigureOut">
               <a:rPr lang="en-US" smtClean="0"/>
-              <a:t>10/27/17</a:t>
+              <a:t>11/2/17</a:t>
             </a:fld>
             <a:endParaRPr lang="en-US"/>
           </a:p>
@@ -25004,7 +24988,7 @@
           <a:p>
             <a:fld id="{82E4D609-7294-A845-AA45-B5A07A659EF5}" type="datetimeFigureOut">
               <a:rPr lang="en-US" smtClean="0"/>
-              <a:t>10/27/17</a:t>
+              <a:t>11/2/17</a:t>
             </a:fld>
             <a:endParaRPr lang="en-US"/>
           </a:p>
@@ -26080,7 +26064,7 @@
           <a:p>
             <a:fld id="{82E4D609-7294-A845-AA45-B5A07A659EF5}" type="datetimeFigureOut">
               <a:rPr lang="en-US" smtClean="0"/>
-              <a:t>10/27/17</a:t>
+              <a:t>11/2/17</a:t>
             </a:fld>
             <a:endParaRPr lang="en-US"/>
           </a:p>
@@ -27183,7 +27167,7 @@
           <a:p>
             <a:fld id="{82E4D609-7294-A845-AA45-B5A07A659EF5}" type="datetimeFigureOut">
               <a:rPr lang="en-US" smtClean="0"/>
-              <a:t>10/27/17</a:t>
+              <a:t>11/2/17</a:t>
             </a:fld>
             <a:endParaRPr lang="en-US"/>
           </a:p>
@@ -28175,7 +28159,7 @@
           <a:p>
             <a:fld id="{82E4D609-7294-A845-AA45-B5A07A659EF5}" type="datetimeFigureOut">
               <a:rPr lang="en-US" smtClean="0"/>
-              <a:t>10/27/17</a:t>
+              <a:t>11/2/17</a:t>
             </a:fld>
             <a:endParaRPr lang="en-US"/>
           </a:p>
@@ -29617,7 +29601,7 @@
           <a:p>
             <a:fld id="{82E4D609-7294-A845-AA45-B5A07A659EF5}" type="datetimeFigureOut">
               <a:rPr lang="en-US" smtClean="0"/>
-              <a:t>10/27/17</a:t>
+              <a:t>11/2/17</a:t>
             </a:fld>
             <a:endParaRPr lang="en-US"/>
           </a:p>
@@ -30311,7 +30295,7 @@
           <a:p>
             <a:fld id="{82E4D609-7294-A845-AA45-B5A07A659EF5}" type="datetimeFigureOut">
               <a:rPr lang="en-US" smtClean="0"/>
-              <a:t>10/27/17</a:t>
+              <a:t>11/2/17</a:t>
             </a:fld>
             <a:endParaRPr lang="en-US"/>
           </a:p>
@@ -31380,21 +31364,8 @@
                   <a:schemeClr val="tx1"/>
                 </a:solidFill>
               </a:rPr>
-              <a:t>Name of person to contact: </a:t>
-            </a:r>
-            <a:r>
-              <a:rPr lang="en-US" dirty="0" smtClean="0">
-                <a:solidFill>
-                  <a:schemeClr val="tx1"/>
-                </a:solidFill>
-              </a:rPr>
-              <a:t>Blah blah</a:t>
-            </a:r>
-            <a:endParaRPr lang="en-US" dirty="0" smtClean="0">
-              <a:solidFill>
-                <a:schemeClr val="tx1"/>
-              </a:solidFill>
-            </a:endParaRPr>
+              <a:t>Name of person to contact: Blah blah</a:t>
+            </a:r>
           </a:p>
           <a:p>
             <a:r>
@@ -31718,15 +31689,7 @@
                   <a:schemeClr val="tx1"/>
                 </a:solidFill>
               </a:rPr>
-              <a:t>Org </a:t>
-            </a:r>
-            <a:r>
-              <a:rPr lang="en-US" dirty="0" smtClean="0">
-                <a:solidFill>
-                  <a:schemeClr val="tx1"/>
-                </a:solidFill>
-              </a:rPr>
-              <a:t>A’s Donations</a:t>
+              <a:t>Org A’s Donations</a:t>
             </a:r>
             <a:endParaRPr lang="en-US" dirty="0">
               <a:solidFill>
@@ -32652,14 +32615,6 @@
           <a:bodyPr rtlCol="0" anchor="ctr"/>
           <a:lstStyle/>
           <a:p>
-            <a:r>
-              <a:rPr lang="en-US" dirty="0" smtClean="0">
-                <a:solidFill>
-                  <a:schemeClr val="tx1"/>
-                </a:solidFill>
-              </a:rPr>
-              <a:t>15</a:t>
-            </a:r>
             <a:endParaRPr lang="en-US" dirty="0">
               <a:solidFill>
                 <a:schemeClr val="tx1"/>
@@ -32990,53 +32945,6 @@
             <a:r>
               <a:rPr lang="en-US" sz="2400" dirty="0" smtClean="0"/>
               <a:t>-</a:t>
-            </a:r>
-            <a:endParaRPr lang="en-US" dirty="0"/>
-          </a:p>
-        </p:txBody>
-      </p:sp>
-      <p:sp>
-        <p:nvSpPr>
-          <p:cNvPr id="16" name="Oval 15"/>
-          <p:cNvSpPr/>
-          <p:nvPr/>
-        </p:nvSpPr>
-        <p:spPr>
-          <a:xfrm>
-            <a:off x="4203531" y="3849811"/>
-            <a:ext cx="321276" cy="311154"/>
-          </a:xfrm>
-          <a:prstGeom prst="ellipse">
-            <a:avLst/>
-          </a:prstGeom>
-          <a:solidFill>
-            <a:srgbClr val="92D050"/>
-          </a:solidFill>
-        </p:spPr>
-        <p:style>
-          <a:lnRef idx="2">
-            <a:schemeClr val="accent1">
-              <a:shade val="50000"/>
-            </a:schemeClr>
-          </a:lnRef>
-          <a:fillRef idx="1">
-            <a:schemeClr val="accent1"/>
-          </a:fillRef>
-          <a:effectRef idx="0">
-            <a:schemeClr val="accent1"/>
-          </a:effectRef>
-          <a:fontRef idx="minor">
-            <a:schemeClr val="lt1"/>
-          </a:fontRef>
-        </p:style>
-        <p:txBody>
-          <a:bodyPr rtlCol="0" anchor="ctr"/>
-          <a:lstStyle/>
-          <a:p>
-            <a:pPr algn="ctr"/>
-            <a:r>
-              <a:rPr lang="en-US" smtClean="0"/>
-              <a:t>+</a:t>
             </a:r>
             <a:endParaRPr lang="en-US" dirty="0"/>
           </a:p>
@@ -36324,7 +36232,7 @@
             <a:pPr algn="ctr"/>
             <a:r>
               <a:rPr lang="en-US" dirty="0" smtClean="0"/>
-              <a:t>Text box to enter food category</a:t>
+              <a:t>Dairy</a:t>
             </a:r>
             <a:endParaRPr lang="en-US" dirty="0"/>
           </a:p>
@@ -36355,53 +36263,6 @@
             <a:r>
               <a:rPr lang="en-US" dirty="0" smtClean="0"/>
               <a:t>Food Category</a:t>
-            </a:r>
-            <a:endParaRPr lang="en-US" dirty="0"/>
-          </a:p>
-        </p:txBody>
-      </p:sp>
-      <p:sp>
-        <p:nvSpPr>
-          <p:cNvPr id="10" name="Oval 9"/>
-          <p:cNvSpPr/>
-          <p:nvPr/>
-        </p:nvSpPr>
-        <p:spPr>
-          <a:xfrm>
-            <a:off x="444844" y="2663133"/>
-            <a:ext cx="321276" cy="311154"/>
-          </a:xfrm>
-          <a:prstGeom prst="ellipse">
-            <a:avLst/>
-          </a:prstGeom>
-          <a:solidFill>
-            <a:srgbClr val="92D050"/>
-          </a:solidFill>
-        </p:spPr>
-        <p:style>
-          <a:lnRef idx="2">
-            <a:schemeClr val="accent1">
-              <a:shade val="50000"/>
-            </a:schemeClr>
-          </a:lnRef>
-          <a:fillRef idx="1">
-            <a:schemeClr val="accent1"/>
-          </a:fillRef>
-          <a:effectRef idx="0">
-            <a:schemeClr val="accent1"/>
-          </a:effectRef>
-          <a:fontRef idx="minor">
-            <a:schemeClr val="lt1"/>
-          </a:fontRef>
-        </p:style>
-        <p:txBody>
-          <a:bodyPr rtlCol="0" anchor="ctr"/>
-          <a:lstStyle/>
-          <a:p>
-            <a:pPr algn="ctr"/>
-            <a:r>
-              <a:rPr lang="en-US" smtClean="0"/>
-              <a:t>+</a:t>
             </a:r>
             <a:endParaRPr lang="en-US" dirty="0"/>
           </a:p>
@@ -36479,10 +36340,6 @@
           <a:lstStyle/>
           <a:p>
             <a:pPr algn="ctr"/>
-            <a:r>
-              <a:rPr lang="en-US" dirty="0" smtClean="0"/>
-              <a:t>Text box to weight</a:t>
-            </a:r>
             <a:endParaRPr lang="en-US" dirty="0"/>
           </a:p>
         </p:txBody>
@@ -36495,7 +36352,7 @@
         </p:nvSpPr>
         <p:spPr>
           <a:xfrm>
-            <a:off x="4588476" y="2974287"/>
+            <a:off x="4588476" y="4960250"/>
             <a:ext cx="2347783" cy="444843"/>
           </a:xfrm>
           <a:prstGeom prst="roundRect">
@@ -36577,53 +36434,6 @@
       </p:sp>
       <p:sp>
         <p:nvSpPr>
-          <p:cNvPr id="16" name="Oval 15"/>
-          <p:cNvSpPr/>
-          <p:nvPr/>
-        </p:nvSpPr>
-        <p:spPr>
-          <a:xfrm>
-            <a:off x="444844" y="2146463"/>
-            <a:ext cx="321276" cy="311154"/>
-          </a:xfrm>
-          <a:prstGeom prst="ellipse">
-            <a:avLst/>
-          </a:prstGeom>
-          <a:solidFill>
-            <a:srgbClr val="FF0000"/>
-          </a:solidFill>
-        </p:spPr>
-        <p:style>
-          <a:lnRef idx="2">
-            <a:schemeClr val="accent1">
-              <a:shade val="50000"/>
-            </a:schemeClr>
-          </a:lnRef>
-          <a:fillRef idx="1">
-            <a:schemeClr val="accent1"/>
-          </a:fillRef>
-          <a:effectRef idx="0">
-            <a:schemeClr val="accent1"/>
-          </a:effectRef>
-          <a:fontRef idx="minor">
-            <a:schemeClr val="lt1"/>
-          </a:fontRef>
-        </p:style>
-        <p:txBody>
-          <a:bodyPr rtlCol="0" anchor="ctr"/>
-          <a:lstStyle/>
-          <a:p>
-            <a:pPr algn="ctr"/>
-            <a:r>
-              <a:rPr lang="en-US" sz="2400" dirty="0" smtClean="0"/>
-              <a:t>-</a:t>
-            </a:r>
-            <a:endParaRPr lang="en-US" dirty="0"/>
-          </a:p>
-        </p:txBody>
-      </p:sp>
-      <p:sp>
-        <p:nvSpPr>
           <p:cNvPr id="17" name="Rectangle 16"/>
           <p:cNvSpPr/>
           <p:nvPr/>
@@ -36702,6 +36512,246 @@
               <a:rPr lang="en-US" dirty="0" smtClean="0"/>
               <a:t>25</a:t>
             </a:r>
+            <a:endParaRPr lang="en-US" dirty="0"/>
+          </a:p>
+        </p:txBody>
+      </p:sp>
+      <p:sp>
+        <p:nvSpPr>
+          <p:cNvPr id="20" name="Rectangle 19"/>
+          <p:cNvSpPr/>
+          <p:nvPr/>
+        </p:nvSpPr>
+        <p:spPr>
+          <a:xfrm>
+            <a:off x="963824" y="2595946"/>
+            <a:ext cx="3138617" cy="356289"/>
+          </a:xfrm>
+          <a:prstGeom prst="rect">
+            <a:avLst/>
+          </a:prstGeom>
+        </p:spPr>
+        <p:style>
+          <a:lnRef idx="2">
+            <a:schemeClr val="accent6"/>
+          </a:lnRef>
+          <a:fillRef idx="1">
+            <a:schemeClr val="lt1"/>
+          </a:fillRef>
+          <a:effectRef idx="0">
+            <a:schemeClr val="accent6"/>
+          </a:effectRef>
+          <a:fontRef idx="minor">
+            <a:schemeClr val="dk1"/>
+          </a:fontRef>
+        </p:style>
+        <p:txBody>
+          <a:bodyPr rtlCol="0" anchor="ctr"/>
+          <a:lstStyle/>
+          <a:p>
+            <a:pPr algn="ctr"/>
+            <a:r>
+              <a:rPr lang="en-US" dirty="0" smtClean="0"/>
+              <a:t>Bakery</a:t>
+            </a:r>
+            <a:endParaRPr lang="en-US" dirty="0"/>
+          </a:p>
+        </p:txBody>
+      </p:sp>
+      <p:sp>
+        <p:nvSpPr>
+          <p:cNvPr id="21" name="Rectangle 20"/>
+          <p:cNvSpPr/>
+          <p:nvPr/>
+        </p:nvSpPr>
+        <p:spPr>
+          <a:xfrm>
+            <a:off x="963824" y="3188386"/>
+            <a:ext cx="3138617" cy="356289"/>
+          </a:xfrm>
+          <a:prstGeom prst="rect">
+            <a:avLst/>
+          </a:prstGeom>
+        </p:spPr>
+        <p:style>
+          <a:lnRef idx="2">
+            <a:schemeClr val="accent6"/>
+          </a:lnRef>
+          <a:fillRef idx="1">
+            <a:schemeClr val="lt1"/>
+          </a:fillRef>
+          <a:effectRef idx="0">
+            <a:schemeClr val="accent6"/>
+          </a:effectRef>
+          <a:fontRef idx="minor">
+            <a:schemeClr val="dk1"/>
+          </a:fontRef>
+        </p:style>
+        <p:txBody>
+          <a:bodyPr rtlCol="0" anchor="ctr"/>
+          <a:lstStyle/>
+          <a:p>
+            <a:pPr algn="ctr"/>
+            <a:r>
+              <a:rPr lang="en-US" dirty="0" smtClean="0"/>
+              <a:t>Produce</a:t>
+            </a:r>
+            <a:endParaRPr lang="en-US" dirty="0"/>
+          </a:p>
+        </p:txBody>
+      </p:sp>
+      <p:sp>
+        <p:nvSpPr>
+          <p:cNvPr id="22" name="Rectangle 21"/>
+          <p:cNvSpPr/>
+          <p:nvPr/>
+        </p:nvSpPr>
+        <p:spPr>
+          <a:xfrm>
+            <a:off x="963824" y="3807765"/>
+            <a:ext cx="3138617" cy="356289"/>
+          </a:xfrm>
+          <a:prstGeom prst="rect">
+            <a:avLst/>
+          </a:prstGeom>
+        </p:spPr>
+        <p:style>
+          <a:lnRef idx="2">
+            <a:schemeClr val="accent6"/>
+          </a:lnRef>
+          <a:fillRef idx="1">
+            <a:schemeClr val="lt1"/>
+          </a:fillRef>
+          <a:effectRef idx="0">
+            <a:schemeClr val="accent6"/>
+          </a:effectRef>
+          <a:fontRef idx="minor">
+            <a:schemeClr val="dk1"/>
+          </a:fontRef>
+        </p:style>
+        <p:txBody>
+          <a:bodyPr rtlCol="0" anchor="ctr"/>
+          <a:lstStyle/>
+          <a:p>
+            <a:pPr algn="ctr"/>
+            <a:r>
+              <a:rPr lang="en-US" dirty="0" smtClean="0"/>
+              <a:t>Meat</a:t>
+            </a:r>
+            <a:endParaRPr lang="en-US" dirty="0"/>
+          </a:p>
+        </p:txBody>
+      </p:sp>
+      <p:sp>
+        <p:nvSpPr>
+          <p:cNvPr id="23" name="Rectangle 22"/>
+          <p:cNvSpPr/>
+          <p:nvPr/>
+        </p:nvSpPr>
+        <p:spPr>
+          <a:xfrm>
+            <a:off x="4588473" y="2653118"/>
+            <a:ext cx="2347783" cy="356289"/>
+          </a:xfrm>
+          <a:prstGeom prst="rect">
+            <a:avLst/>
+          </a:prstGeom>
+        </p:spPr>
+        <p:style>
+          <a:lnRef idx="2">
+            <a:schemeClr val="accent6"/>
+          </a:lnRef>
+          <a:fillRef idx="1">
+            <a:schemeClr val="lt1"/>
+          </a:fillRef>
+          <a:effectRef idx="0">
+            <a:schemeClr val="accent6"/>
+          </a:effectRef>
+          <a:fontRef idx="minor">
+            <a:schemeClr val="dk1"/>
+          </a:fontRef>
+        </p:style>
+        <p:txBody>
+          <a:bodyPr rtlCol="0" anchor="ctr"/>
+          <a:lstStyle/>
+          <a:p>
+            <a:pPr algn="ctr"/>
+            <a:endParaRPr lang="en-US" dirty="0"/>
+          </a:p>
+        </p:txBody>
+      </p:sp>
+      <p:sp>
+        <p:nvSpPr>
+          <p:cNvPr id="24" name="Rectangle 23"/>
+          <p:cNvSpPr/>
+          <p:nvPr/>
+        </p:nvSpPr>
+        <p:spPr>
+          <a:xfrm>
+            <a:off x="4588474" y="3264089"/>
+            <a:ext cx="2347783" cy="356289"/>
+          </a:xfrm>
+          <a:prstGeom prst="rect">
+            <a:avLst/>
+          </a:prstGeom>
+        </p:spPr>
+        <p:style>
+          <a:lnRef idx="2">
+            <a:schemeClr val="accent6"/>
+          </a:lnRef>
+          <a:fillRef idx="1">
+            <a:schemeClr val="lt1"/>
+          </a:fillRef>
+          <a:effectRef idx="0">
+            <a:schemeClr val="accent6"/>
+          </a:effectRef>
+          <a:fontRef idx="minor">
+            <a:schemeClr val="dk1"/>
+          </a:fontRef>
+        </p:style>
+        <p:txBody>
+          <a:bodyPr rtlCol="0" anchor="ctr"/>
+          <a:lstStyle/>
+          <a:p>
+            <a:pPr algn="ctr"/>
+            <a:endParaRPr lang="en-US" dirty="0"/>
+          </a:p>
+        </p:txBody>
+      </p:sp>
+      <p:sp>
+        <p:nvSpPr>
+          <p:cNvPr id="25" name="Rectangle 24"/>
+          <p:cNvSpPr/>
+          <p:nvPr/>
+        </p:nvSpPr>
+        <p:spPr>
+          <a:xfrm>
+            <a:off x="4588475" y="3840590"/>
+            <a:ext cx="2347783" cy="356289"/>
+          </a:xfrm>
+          <a:prstGeom prst="rect">
+            <a:avLst/>
+          </a:prstGeom>
+        </p:spPr>
+        <p:style>
+          <a:lnRef idx="2">
+            <a:schemeClr val="accent6"/>
+          </a:lnRef>
+          <a:fillRef idx="1">
+            <a:schemeClr val="lt1"/>
+          </a:fillRef>
+          <a:effectRef idx="0">
+            <a:schemeClr val="accent6"/>
+          </a:effectRef>
+          <a:fontRef idx="minor">
+            <a:schemeClr val="dk1"/>
+          </a:fontRef>
+        </p:style>
+        <p:txBody>
+          <a:bodyPr rtlCol="0" anchor="ctr"/>
+          <a:lstStyle/>
+          <a:p>
+            <a:pPr algn="ctr"/>
             <a:endParaRPr lang="en-US" dirty="0"/>
           </a:p>
         </p:txBody>

</xml_diff>